<commit_message>
Update QR code for slide deck
</commit_message>
<xml_diff>
--- a/VS 2017 .NET Core Tooling.pptx
+++ b/VS 2017 .NET Core Tooling.pptx
@@ -18062,38 +18062,6 @@
       </p:sp>
       <p:sp>
         <p:nvSpPr>
-          <p:cNvPr id="3" name="Content Placeholder 2"/>
-          <p:cNvSpPr>
-            <a:spLocks noGrp="1"/>
-          </p:cNvSpPr>
-          <p:nvPr>
-            <p:ph sz="half" idx="1"/>
-          </p:nvPr>
-        </p:nvSpPr>
-        <p:spPr>
-          <a:solidFill>
-            <a:schemeClr val="bg1">
-              <a:tint val="95000"/>
-              <a:satMod val="170000"/>
-              <a:alpha val="75000"/>
-            </a:schemeClr>
-          </a:solidFill>
-        </p:spPr>
-        <p:txBody>
-          <a:bodyPr>
-            <a:normAutofit fontScale="70000" lnSpcReduction="20000"/>
-          </a:bodyPr>
-          <a:lstStyle/>
-          <a:p>
-            <a:pPr marL="0" indent="0">
-              <a:buNone/>
-            </a:pPr>
-            <a:endParaRPr lang="en-US" dirty="0"/>
-          </a:p>
-        </p:txBody>
-      </p:sp>
-      <p:sp>
-        <p:nvSpPr>
           <p:cNvPr id="5" name="Content Placeholder 4"/>
           <p:cNvSpPr>
             <a:spLocks noGrp="1"/>
@@ -18390,6 +18358,35 @@
               </a14:hiddenFill>
             </a:ext>
           </a:extLst>
+        </p:spPr>
+      </p:pic>
+      <p:pic>
+        <p:nvPicPr>
+          <p:cNvPr id="7" name="Content Placeholder 6"/>
+          <p:cNvPicPr>
+            <a:picLocks noGrp="1" noChangeAspect="1"/>
+          </p:cNvPicPr>
+          <p:nvPr>
+            <p:ph sz="half" idx="1"/>
+          </p:nvPr>
+        </p:nvPicPr>
+        <p:blipFill>
+          <a:blip r:embed="rId7">
+            <a:extLst>
+              <a:ext uri="{28A0092B-C50C-407E-A947-70E740481C1C}">
+                <a14:useLocalDpi xmlns:a14="http://schemas.microsoft.com/office/drawing/2010/main" val="0"/>
+              </a:ext>
+            </a:extLst>
+          </a:blip>
+          <a:stretch>
+            <a:fillRect/>
+          </a:stretch>
+        </p:blipFill>
+        <p:spPr>
+          <a:xfrm>
+            <a:off x="1285875" y="1858169"/>
+            <a:ext cx="4286250" cy="4286250"/>
+          </a:xfrm>
         </p:spPr>
       </p:pic>
     </p:spTree>

</xml_diff>

<commit_message>
Remove duplicate QR code
</commit_message>
<xml_diff>
--- a/VS 2017 .NET Core Tooling.pptx
+++ b/VS 2017 .NET Core Tooling.pptx
@@ -18030,6 +18030,35 @@
           <a:chExt cx="0" cy="0"/>
         </a:xfrm>
       </p:grpSpPr>
+      <p:pic>
+        <p:nvPicPr>
+          <p:cNvPr id="7" name="Content Placeholder 6"/>
+          <p:cNvPicPr>
+            <a:picLocks noGrp="1" noChangeAspect="1"/>
+          </p:cNvPicPr>
+          <p:nvPr>
+            <p:ph sz="half" idx="1"/>
+          </p:nvPr>
+        </p:nvPicPr>
+        <p:blipFill>
+          <a:blip r:embed="rId3">
+            <a:extLst>
+              <a:ext uri="{28A0092B-C50C-407E-A947-70E740481C1C}">
+                <a14:useLocalDpi xmlns:a14="http://schemas.microsoft.com/office/drawing/2010/main" val="0"/>
+              </a:ext>
+            </a:extLst>
+          </a:blip>
+          <a:stretch>
+            <a:fillRect/>
+          </a:stretch>
+        </p:blipFill>
+        <p:spPr>
+          <a:xfrm>
+            <a:off x="1285875" y="1858169"/>
+            <a:ext cx="4286250" cy="4286250"/>
+          </a:xfrm>
+        </p:spPr>
+      </p:pic>
       <p:sp>
         <p:nvSpPr>
           <p:cNvPr id="2" name="Title 1"/>
@@ -18223,30 +18252,6 @@
           </a:p>
         </p:txBody>
       </p:sp>
-      <p:pic>
-        <p:nvPicPr>
-          <p:cNvPr id="11" name="Picture 10"/>
-          <p:cNvPicPr>
-            <a:picLocks noChangeAspect="1"/>
-          </p:cNvPicPr>
-          <p:nvPr/>
-        </p:nvPicPr>
-        <p:blipFill>
-          <a:blip r:embed="rId3"/>
-          <a:stretch>
-            <a:fillRect/>
-          </a:stretch>
-        </p:blipFill>
-        <p:spPr>
-          <a:xfrm>
-            <a:off x="1378796" y="1913555"/>
-            <a:ext cx="4208023" cy="4208023"/>
-          </a:xfrm>
-          <a:prstGeom prst="rect">
-            <a:avLst/>
-          </a:prstGeom>
-        </p:spPr>
-      </p:pic>
       <p:pic>
         <p:nvPicPr>
           <p:cNvPr id="12" name="Picture 11"/>
@@ -18358,35 +18363,6 @@
               </a14:hiddenFill>
             </a:ext>
           </a:extLst>
-        </p:spPr>
-      </p:pic>
-      <p:pic>
-        <p:nvPicPr>
-          <p:cNvPr id="7" name="Content Placeholder 6"/>
-          <p:cNvPicPr>
-            <a:picLocks noGrp="1" noChangeAspect="1"/>
-          </p:cNvPicPr>
-          <p:nvPr>
-            <p:ph sz="half" idx="1"/>
-          </p:nvPr>
-        </p:nvPicPr>
-        <p:blipFill>
-          <a:blip r:embed="rId7">
-            <a:extLst>
-              <a:ext uri="{28A0092B-C50C-407E-A947-70E740481C1C}">
-                <a14:useLocalDpi xmlns:a14="http://schemas.microsoft.com/office/drawing/2010/main" val="0"/>
-              </a:ext>
-            </a:extLst>
-          </a:blip>
-          <a:stretch>
-            <a:fillRect/>
-          </a:stretch>
-        </p:blipFill>
-        <p:spPr>
-          <a:xfrm>
-            <a:off x="1285875" y="1858169"/>
-            <a:ext cx="4286250" cy="4286250"/>
-          </a:xfrm>
         </p:spPr>
       </p:pic>
     </p:spTree>

</xml_diff>